<commit_message>
added acme angular app + web api + sql
</commit_message>
<xml_diff>
--- a/aks-seleniumgrid/selgridonaks.pptx
+++ b/aks-seleniumgrid/selgridonaks.pptx
@@ -4225,6 +4225,39 @@
               <a:t>)</a:t>
             </a:r>
           </a:p>
+          <a:p>
+            <a:r>
+              <a:rPr lang="en-US" dirty="0">
+                <a:solidFill>
+                  <a:schemeClr val="bg1"/>
+                </a:solidFill>
+                <a:latin typeface="Segoe UI Light" panose="020B0502040204020203" pitchFamily="34" charset="0"/>
+                <a:cs typeface="Segoe UI Light" panose="020B0502040204020203" pitchFamily="34" charset="0"/>
+              </a:rPr>
+              <a:t>Source Code (</a:t>
+            </a:r>
+            <a:r>
+              <a:rPr lang="en-US" dirty="0">
+                <a:solidFill>
+                  <a:schemeClr val="bg1"/>
+                </a:solidFill>
+                <a:latin typeface="Segoe UI Light" panose="020B0502040204020203" pitchFamily="34" charset="0"/>
+                <a:cs typeface="Segoe UI Light" panose="020B0502040204020203" pitchFamily="34" charset="0"/>
+                <a:hlinkClick r:id="rId4"/>
+              </a:rPr>
+              <a:t>Git Hub</a:t>
+            </a:r>
+            <a:r>
+              <a:rPr lang="en-US" dirty="0">
+                <a:solidFill>
+                  <a:schemeClr val="bg1"/>
+                </a:solidFill>
+                <a:latin typeface="Segoe UI Light" panose="020B0502040204020203" pitchFamily="34" charset="0"/>
+                <a:cs typeface="Segoe UI Light" panose="020B0502040204020203" pitchFamily="34" charset="0"/>
+              </a:rPr>
+              <a:t>)</a:t>
+            </a:r>
+          </a:p>
         </p:txBody>
       </p:sp>
     </p:spTree>
@@ -4608,6 +4641,92 @@
   <p:clrMapOvr>
     <a:masterClrMapping/>
   </p:clrMapOvr>
+  <p:timing>
+    <p:tnLst>
+      <p:par>
+        <p:cTn id="1" dur="indefinite" restart="never" nodeType="tmRoot">
+          <p:childTnLst>
+            <p:seq concurrent="1" nextAc="seek">
+              <p:cTn id="2" dur="indefinite" nodeType="mainSeq">
+                <p:childTnLst>
+                  <p:par>
+                    <p:cTn id="3" fill="hold">
+                      <p:stCondLst>
+                        <p:cond delay="indefinite"/>
+                      </p:stCondLst>
+                      <p:childTnLst>
+                        <p:par>
+                          <p:cTn id="4" fill="hold">
+                            <p:stCondLst>
+                              <p:cond delay="0"/>
+                            </p:stCondLst>
+                            <p:childTnLst>
+                              <p:par>
+                                <p:cTn id="5" presetID="10" presetClass="entr" presetSubtype="0" fill="hold" grpId="0" nodeType="clickEffect">
+                                  <p:stCondLst>
+                                    <p:cond delay="0"/>
+                                  </p:stCondLst>
+                                  <p:childTnLst>
+                                    <p:set>
+                                      <p:cBhvr>
+                                        <p:cTn id="6" dur="1" fill="hold">
+                                          <p:stCondLst>
+                                            <p:cond delay="0"/>
+                                          </p:stCondLst>
+                                        </p:cTn>
+                                        <p:tgtEl>
+                                          <p:spTgt spid="4"/>
+                                        </p:tgtEl>
+                                        <p:attrNameLst>
+                                          <p:attrName>style.visibility</p:attrName>
+                                        </p:attrNameLst>
+                                      </p:cBhvr>
+                                      <p:to>
+                                        <p:strVal val="visible"/>
+                                      </p:to>
+                                    </p:set>
+                                    <p:animEffect transition="in" filter="fade">
+                                      <p:cBhvr>
+                                        <p:cTn id="7" dur="500"/>
+                                        <p:tgtEl>
+                                          <p:spTgt spid="4"/>
+                                        </p:tgtEl>
+                                      </p:cBhvr>
+                                    </p:animEffect>
+                                  </p:childTnLst>
+                                </p:cTn>
+                              </p:par>
+                            </p:childTnLst>
+                          </p:cTn>
+                        </p:par>
+                      </p:childTnLst>
+                    </p:cTn>
+                  </p:par>
+                </p:childTnLst>
+              </p:cTn>
+              <p:prevCondLst>
+                <p:cond evt="onPrev" delay="0">
+                  <p:tgtEl>
+                    <p:sldTgt/>
+                  </p:tgtEl>
+                </p:cond>
+              </p:prevCondLst>
+              <p:nextCondLst>
+                <p:cond evt="onNext" delay="0">
+                  <p:tgtEl>
+                    <p:sldTgt/>
+                  </p:tgtEl>
+                </p:cond>
+              </p:nextCondLst>
+            </p:seq>
+          </p:childTnLst>
+        </p:cTn>
+      </p:par>
+    </p:tnLst>
+    <p:bldLst>
+      <p:bldP spid="4" grpId="0"/>
+    </p:bldLst>
+  </p:timing>
 </p:sld>
 </file>
 
@@ -6149,6 +6268,27 @@
             </a:r>
           </a:p>
           <a:p>
+            <a:r>
+              <a:rPr lang="pt-BR" dirty="0">
+                <a:solidFill>
+                  <a:schemeClr val="bg1"/>
+                </a:solidFill>
+                <a:latin typeface="Segoe UI Light" panose="020B0502040204020203" pitchFamily="34" charset="0"/>
+                <a:cs typeface="Segoe UI Light" panose="020B0502040204020203" pitchFamily="34" charset="0"/>
+              </a:rPr>
+              <a:t>az aks delete -g sg-rg-cu -n selenium-grid</a:t>
+            </a:r>
+          </a:p>
+          <a:p>
+            <a:endParaRPr lang="pt-BR" dirty="0">
+              <a:solidFill>
+                <a:schemeClr val="bg1"/>
+              </a:solidFill>
+              <a:latin typeface="Segoe UI Light" panose="020B0502040204020203" pitchFamily="34" charset="0"/>
+              <a:cs typeface="Segoe UI Light" panose="020B0502040204020203" pitchFamily="34" charset="0"/>
+            </a:endParaRPr>
+          </a:p>
+          <a:p>
             <a:endParaRPr lang="en-US" dirty="0">
               <a:solidFill>
                 <a:schemeClr val="bg1"/>
@@ -6408,27 +6548,7 @@
                 <a:latin typeface="Segoe UI Light" panose="020B0502040204020203" pitchFamily="34" charset="0"/>
                 <a:cs typeface="Segoe UI Light" panose="020B0502040204020203" pitchFamily="34" charset="0"/>
               </a:rPr>
-              <a:t>="HUB_PORT_4444_TCP_ADDR</a:t>
-            </a:r>
-            <a:r>
-              <a:rPr lang="en-US" sz="2000">
-                <a:solidFill>
-                  <a:schemeClr val="bg1"/>
-                </a:solidFill>
-                <a:latin typeface="Segoe UI Light" panose="020B0502040204020203" pitchFamily="34" charset="0"/>
-                <a:cs typeface="Segoe UI Light" panose="020B0502040204020203" pitchFamily="34" charset="0"/>
-              </a:rPr>
-              <a:t>=selenium-grid" </a:t>
-            </a:r>
-            <a:r>
-              <a:rPr lang="en-US" sz="2000" dirty="0">
-                <a:solidFill>
-                  <a:schemeClr val="bg1"/>
-                </a:solidFill>
-                <a:latin typeface="Segoe UI Light" panose="020B0502040204020203" pitchFamily="34" charset="0"/>
-                <a:cs typeface="Segoe UI Light" panose="020B0502040204020203" pitchFamily="34" charset="0"/>
-              </a:rPr>
-              <a:t>--</a:t>
+              <a:t>="HUB_PORT_4444_TCP_ADDR=selenium-grid" --</a:t>
             </a:r>
             <a:r>
               <a:rPr lang="en-US" sz="2000" dirty="0" err="1">

</xml_diff>